<commit_message>
Add line graph to show change in age cohorts over time
</commit_message>
<xml_diff>
--- a/City Cemetery Tour Visualizations.pptx
+++ b/City Cemetery Tour Visualizations.pptx
@@ -8,7 +8,8 @@
     <p:sldId id="256" r:id="rId2"/>
     <p:sldId id="257" r:id="rId3"/>
     <p:sldId id="258" r:id="rId4"/>
-    <p:sldId id="259" r:id="rId5"/>
+    <p:sldId id="260" r:id="rId5"/>
+    <p:sldId id="259" r:id="rId6"/>
   </p:sldIdLst>
   <p:sldSz cx="12192000" cy="6858000"/>
   <p:notesSz cx="6858000" cy="9144000"/>
@@ -1330,7 +1331,6 @@
   <c:externalData r:id="rId3">
     <c:autoUpdate val="0"/>
   </c:externalData>
-  <c:userShapes r:id="rId4"/>
 </c:chartSpace>
 </file>
 
@@ -2705,6 +2705,674 @@
 </c:chartSpace>
 </file>
 
+<file path=ppt/charts/chart7.xml><?xml version="1.0" encoding="utf-8"?>
+<c:chartSpace xmlns:c="http://schemas.openxmlformats.org/drawingml/2006/chart" xmlns:a="http://schemas.openxmlformats.org/drawingml/2006/main" xmlns:r="http://schemas.openxmlformats.org/officeDocument/2006/relationships" xmlns:c16r2="http://schemas.microsoft.com/office/drawing/2015/06/chart">
+  <c:date1904 val="0"/>
+  <c:lang val="en-US"/>
+  <c:roundedCorners val="0"/>
+  <mc:AlternateContent xmlns:mc="http://schemas.openxmlformats.org/markup-compatibility/2006">
+    <mc:Choice xmlns:c14="http://schemas.microsoft.com/office/drawing/2007/8/2/chart" Requires="c14">
+      <c14:style val="102"/>
+    </mc:Choice>
+    <mc:Fallback>
+      <c:style val="2"/>
+    </mc:Fallback>
+  </mc:AlternateContent>
+  <c:chart>
+    <c:title>
+      <c:tx>
+        <c:rich>
+          <a:bodyPr rot="0" spcFirstLastPara="1" vertOverflow="ellipsis" vert="horz" wrap="square" anchor="ctr" anchorCtr="1"/>
+          <a:lstStyle/>
+          <a:p>
+            <a:pPr>
+              <a:defRPr sz="1400" b="0" i="0" u="none" strike="noStrike" kern="1200" spc="0" baseline="0">
+                <a:solidFill>
+                  <a:schemeClr val="tx1">
+                    <a:lumMod val="65000"/>
+                    <a:lumOff val="35000"/>
+                  </a:schemeClr>
+                </a:solidFill>
+                <a:latin typeface="+mn-lt"/>
+                <a:ea typeface="+mn-ea"/>
+                <a:cs typeface="+mn-cs"/>
+              </a:defRPr>
+            </a:pPr>
+            <a:r>
+              <a:rPr lang="en-US"/>
+              <a:t>Percentage of Total Deaths i</a:t>
+            </a:r>
+            <a:r>
+              <a:rPr lang="en-US" baseline="0"/>
+              <a:t>n Cohorts</a:t>
+            </a:r>
+            <a:endParaRPr lang="en-US"/>
+          </a:p>
+        </c:rich>
+      </c:tx>
+      <c:overlay val="0"/>
+      <c:spPr>
+        <a:noFill/>
+        <a:ln>
+          <a:noFill/>
+        </a:ln>
+        <a:effectLst/>
+      </c:spPr>
+      <c:txPr>
+        <a:bodyPr rot="0" spcFirstLastPara="1" vertOverflow="ellipsis" vert="horz" wrap="square" anchor="ctr" anchorCtr="1"/>
+        <a:lstStyle/>
+        <a:p>
+          <a:pPr>
+            <a:defRPr sz="1400" b="0" i="0" u="none" strike="noStrike" kern="1200" spc="0" baseline="0">
+              <a:solidFill>
+                <a:schemeClr val="tx1">
+                  <a:lumMod val="65000"/>
+                  <a:lumOff val="35000"/>
+                </a:schemeClr>
+              </a:solidFill>
+              <a:latin typeface="+mn-lt"/>
+              <a:ea typeface="+mn-ea"/>
+              <a:cs typeface="+mn-cs"/>
+            </a:defRPr>
+          </a:pPr>
+          <a:endParaRPr lang="en-US"/>
+        </a:p>
+      </c:txPr>
+    </c:title>
+    <c:autoTitleDeleted val="0"/>
+    <c:plotArea>
+      <c:layout>
+        <c:manualLayout>
+          <c:layoutTarget val="inner"/>
+          <c:xMode val="edge"/>
+          <c:yMode val="edge"/>
+          <c:x val="6.5676271896548774E-2"/>
+          <c:y val="2.3238707161621765E-2"/>
+          <c:w val="0.93432376899454606"/>
+          <c:h val="0.87204584471699143"/>
+        </c:manualLayout>
+      </c:layout>
+      <c:lineChart>
+        <c:grouping val="standard"/>
+        <c:varyColors val="0"/>
+        <c:ser>
+          <c:idx val="0"/>
+          <c:order val="0"/>
+          <c:tx>
+            <c:strRef>
+              <c:f>'Age at Death by Year Group'!$B$34</c:f>
+              <c:strCache>
+                <c:ptCount val="1"/>
+                <c:pt idx="0">
+                  <c:v>0-18</c:v>
+                </c:pt>
+              </c:strCache>
+            </c:strRef>
+          </c:tx>
+          <c:spPr>
+            <a:ln w="38100" cap="rnd">
+              <a:solidFill>
+                <a:schemeClr val="accent3">
+                  <a:lumMod val="60000"/>
+                  <a:lumOff val="40000"/>
+                </a:schemeClr>
+              </a:solidFill>
+              <a:round/>
+            </a:ln>
+            <a:effectLst/>
+          </c:spPr>
+          <c:marker>
+            <c:symbol val="none"/>
+          </c:marker>
+          <c:cat>
+            <c:strRef>
+              <c:f>'Age at Death by Year Group'!$A$35:$A$38</c:f>
+              <c:strCache>
+                <c:ptCount val="4"/>
+                <c:pt idx="0">
+                  <c:v>Before 1880</c:v>
+                </c:pt>
+                <c:pt idx="1">
+                  <c:v>1881 - 1900</c:v>
+                </c:pt>
+                <c:pt idx="2">
+                  <c:v>1901 - 1920</c:v>
+                </c:pt>
+                <c:pt idx="3">
+                  <c:v>After 1921</c:v>
+                </c:pt>
+              </c:strCache>
+            </c:strRef>
+          </c:cat>
+          <c:val>
+            <c:numRef>
+              <c:f>'Age at Death by Year Group'!$B$35:$B$38</c:f>
+              <c:numCache>
+                <c:formatCode>0%</c:formatCode>
+                <c:ptCount val="4"/>
+                <c:pt idx="0">
+                  <c:v>0.25953950924224406</c:v>
+                </c:pt>
+                <c:pt idx="1">
+                  <c:v>0.18079673135852911</c:v>
+                </c:pt>
+                <c:pt idx="2">
+                  <c:v>9.4339622641509441E-2</c:v>
+                </c:pt>
+                <c:pt idx="3">
+                  <c:v>6.746987951807229E-2</c:v>
+                </c:pt>
+              </c:numCache>
+            </c:numRef>
+          </c:val>
+          <c:smooth val="0"/>
+          <c:extLst>
+            <c:ext xmlns:c16="http://schemas.microsoft.com/office/drawing/2014/chart" uri="{C3380CC4-5D6E-409C-BE32-E72D297353CC}">
+              <c16:uniqueId val="{00000000-3992-4DDA-91B8-B8CA6EAB1073}"/>
+            </c:ext>
+          </c:extLst>
+        </c:ser>
+        <c:ser>
+          <c:idx val="1"/>
+          <c:order val="1"/>
+          <c:tx>
+            <c:strRef>
+              <c:f>'Age at Death by Year Group'!$C$34</c:f>
+              <c:strCache>
+                <c:ptCount val="1"/>
+                <c:pt idx="0">
+                  <c:v>19-25</c:v>
+                </c:pt>
+              </c:strCache>
+            </c:strRef>
+          </c:tx>
+          <c:spPr>
+            <a:ln w="38100" cap="rnd">
+              <a:solidFill>
+                <a:schemeClr val="accent3">
+                  <a:lumMod val="60000"/>
+                  <a:lumOff val="40000"/>
+                </a:schemeClr>
+              </a:solidFill>
+              <a:round/>
+            </a:ln>
+            <a:effectLst/>
+          </c:spPr>
+          <c:marker>
+            <c:symbol val="none"/>
+          </c:marker>
+          <c:cat>
+            <c:strRef>
+              <c:f>'Age at Death by Year Group'!$A$35:$A$38</c:f>
+              <c:strCache>
+                <c:ptCount val="4"/>
+                <c:pt idx="0">
+                  <c:v>Before 1880</c:v>
+                </c:pt>
+                <c:pt idx="1">
+                  <c:v>1881 - 1900</c:v>
+                </c:pt>
+                <c:pt idx="2">
+                  <c:v>1901 - 1920</c:v>
+                </c:pt>
+                <c:pt idx="3">
+                  <c:v>After 1921</c:v>
+                </c:pt>
+              </c:strCache>
+            </c:strRef>
+          </c:cat>
+          <c:val>
+            <c:numRef>
+              <c:f>'Age at Death by Year Group'!$C$35:$C$38</c:f>
+              <c:numCache>
+                <c:formatCode>0%</c:formatCode>
+                <c:ptCount val="4"/>
+                <c:pt idx="0">
+                  <c:v>0.15598313695816668</c:v>
+                </c:pt>
+                <c:pt idx="1">
+                  <c:v>8.1716036772216546E-2</c:v>
+                </c:pt>
+                <c:pt idx="2">
+                  <c:v>4.0094339622641507E-2</c:v>
+                </c:pt>
+                <c:pt idx="3">
+                  <c:v>2.1686746987951807E-2</c:v>
+                </c:pt>
+              </c:numCache>
+            </c:numRef>
+          </c:val>
+          <c:smooth val="0"/>
+          <c:extLst>
+            <c:ext xmlns:c16="http://schemas.microsoft.com/office/drawing/2014/chart" uri="{C3380CC4-5D6E-409C-BE32-E72D297353CC}">
+              <c16:uniqueId val="{00000001-3992-4DDA-91B8-B8CA6EAB1073}"/>
+            </c:ext>
+          </c:extLst>
+        </c:ser>
+        <c:ser>
+          <c:idx val="2"/>
+          <c:order val="2"/>
+          <c:tx>
+            <c:strRef>
+              <c:f>'Age at Death by Year Group'!$D$34</c:f>
+              <c:strCache>
+                <c:ptCount val="1"/>
+                <c:pt idx="0">
+                  <c:v>26-40</c:v>
+                </c:pt>
+              </c:strCache>
+            </c:strRef>
+          </c:tx>
+          <c:spPr>
+            <a:ln w="38100" cap="rnd">
+              <a:solidFill>
+                <a:schemeClr val="accent3">
+                  <a:lumMod val="60000"/>
+                  <a:lumOff val="40000"/>
+                </a:schemeClr>
+              </a:solidFill>
+              <a:round/>
+            </a:ln>
+            <a:effectLst/>
+          </c:spPr>
+          <c:marker>
+            <c:symbol val="none"/>
+          </c:marker>
+          <c:cat>
+            <c:strRef>
+              <c:f>'Age at Death by Year Group'!$A$35:$A$38</c:f>
+              <c:strCache>
+                <c:ptCount val="4"/>
+                <c:pt idx="0">
+                  <c:v>Before 1880</c:v>
+                </c:pt>
+                <c:pt idx="1">
+                  <c:v>1881 - 1900</c:v>
+                </c:pt>
+                <c:pt idx="2">
+                  <c:v>1901 - 1920</c:v>
+                </c:pt>
+                <c:pt idx="3">
+                  <c:v>After 1921</c:v>
+                </c:pt>
+              </c:strCache>
+            </c:strRef>
+          </c:cat>
+          <c:val>
+            <c:numRef>
+              <c:f>'Age at Death by Year Group'!$D$35:$D$38</c:f>
+              <c:numCache>
+                <c:formatCode>0%</c:formatCode>
+                <c:ptCount val="4"/>
+                <c:pt idx="0">
+                  <c:v>0.25240514538968761</c:v>
+                </c:pt>
+                <c:pt idx="1">
+                  <c:v>0.1481103166496425</c:v>
+                </c:pt>
+                <c:pt idx="2">
+                  <c:v>8.4905660377358486E-2</c:v>
+                </c:pt>
+                <c:pt idx="3">
+                  <c:v>6.9879518072289162E-2</c:v>
+                </c:pt>
+              </c:numCache>
+            </c:numRef>
+          </c:val>
+          <c:smooth val="0"/>
+          <c:extLst>
+            <c:ext xmlns:c16="http://schemas.microsoft.com/office/drawing/2014/chart" uri="{C3380CC4-5D6E-409C-BE32-E72D297353CC}">
+              <c16:uniqueId val="{00000002-3992-4DDA-91B8-B8CA6EAB1073}"/>
+            </c:ext>
+          </c:extLst>
+        </c:ser>
+        <c:ser>
+          <c:idx val="3"/>
+          <c:order val="3"/>
+          <c:tx>
+            <c:strRef>
+              <c:f>'Age at Death by Year Group'!$E$34</c:f>
+              <c:strCache>
+                <c:ptCount val="1"/>
+                <c:pt idx="0">
+                  <c:v>40-64</c:v>
+                </c:pt>
+              </c:strCache>
+            </c:strRef>
+          </c:tx>
+          <c:spPr>
+            <a:ln w="38100" cap="rnd">
+              <a:solidFill>
+                <a:schemeClr val="accent3">
+                  <a:lumMod val="60000"/>
+                  <a:lumOff val="40000"/>
+                </a:schemeClr>
+              </a:solidFill>
+              <a:round/>
+            </a:ln>
+            <a:effectLst/>
+          </c:spPr>
+          <c:marker>
+            <c:symbol val="none"/>
+          </c:marker>
+          <c:cat>
+            <c:strRef>
+              <c:f>'Age at Death by Year Group'!$A$35:$A$38</c:f>
+              <c:strCache>
+                <c:ptCount val="4"/>
+                <c:pt idx="0">
+                  <c:v>Before 1880</c:v>
+                </c:pt>
+                <c:pt idx="1">
+                  <c:v>1881 - 1900</c:v>
+                </c:pt>
+                <c:pt idx="2">
+                  <c:v>1901 - 1920</c:v>
+                </c:pt>
+                <c:pt idx="3">
+                  <c:v>After 1921</c:v>
+                </c:pt>
+              </c:strCache>
+            </c:strRef>
+          </c:cat>
+          <c:val>
+            <c:numRef>
+              <c:f>'Age at Death by Year Group'!$E$35:$E$38</c:f>
+              <c:numCache>
+                <c:formatCode>0%</c:formatCode>
+                <c:ptCount val="4"/>
+                <c:pt idx="0">
+                  <c:v>0.21446330126472815</c:v>
+                </c:pt>
+                <c:pt idx="1">
+                  <c:v>0.29315628192032689</c:v>
+                </c:pt>
+                <c:pt idx="2">
+                  <c:v>0.33254716981132076</c:v>
+                </c:pt>
+                <c:pt idx="3">
+                  <c:v>0.2433734939759036</c:v>
+                </c:pt>
+              </c:numCache>
+            </c:numRef>
+          </c:val>
+          <c:smooth val="0"/>
+          <c:extLst>
+            <c:ext xmlns:c16="http://schemas.microsoft.com/office/drawing/2014/chart" uri="{C3380CC4-5D6E-409C-BE32-E72D297353CC}">
+              <c16:uniqueId val="{00000003-3992-4DDA-91B8-B8CA6EAB1073}"/>
+            </c:ext>
+          </c:extLst>
+        </c:ser>
+        <c:ser>
+          <c:idx val="4"/>
+          <c:order val="4"/>
+          <c:tx>
+            <c:strRef>
+              <c:f>'Age at Death by Year Group'!$F$34</c:f>
+              <c:strCache>
+                <c:ptCount val="1"/>
+                <c:pt idx="0">
+                  <c:v>65+</c:v>
+                </c:pt>
+              </c:strCache>
+            </c:strRef>
+          </c:tx>
+          <c:spPr>
+            <a:ln w="38100" cap="rnd">
+              <a:solidFill>
+                <a:schemeClr val="accent5"/>
+              </a:solidFill>
+              <a:round/>
+            </a:ln>
+            <a:effectLst/>
+          </c:spPr>
+          <c:marker>
+            <c:symbol val="none"/>
+          </c:marker>
+          <c:cat>
+            <c:strRef>
+              <c:f>'Age at Death by Year Group'!$A$35:$A$38</c:f>
+              <c:strCache>
+                <c:ptCount val="4"/>
+                <c:pt idx="0">
+                  <c:v>Before 1880</c:v>
+                </c:pt>
+                <c:pt idx="1">
+                  <c:v>1881 - 1900</c:v>
+                </c:pt>
+                <c:pt idx="2">
+                  <c:v>1901 - 1920</c:v>
+                </c:pt>
+                <c:pt idx="3">
+                  <c:v>After 1921</c:v>
+                </c:pt>
+              </c:strCache>
+            </c:strRef>
+          </c:cat>
+          <c:val>
+            <c:numRef>
+              <c:f>'Age at Death by Year Group'!$F$35:$F$38</c:f>
+              <c:numCache>
+                <c:formatCode>0%</c:formatCode>
+                <c:ptCount val="4"/>
+                <c:pt idx="0">
+                  <c:v>0.1176089071451735</c:v>
+                </c:pt>
+                <c:pt idx="1">
+                  <c:v>0.296220633299285</c:v>
+                </c:pt>
+                <c:pt idx="2">
+                  <c:v>0.44811320754716982</c:v>
+                </c:pt>
+                <c:pt idx="3">
+                  <c:v>0.59759036144578315</c:v>
+                </c:pt>
+              </c:numCache>
+            </c:numRef>
+          </c:val>
+          <c:smooth val="0"/>
+          <c:extLst>
+            <c:ext xmlns:c16="http://schemas.microsoft.com/office/drawing/2014/chart" uri="{C3380CC4-5D6E-409C-BE32-E72D297353CC}">
+              <c16:uniqueId val="{00000004-3992-4DDA-91B8-B8CA6EAB1073}"/>
+            </c:ext>
+          </c:extLst>
+        </c:ser>
+        <c:dLbls>
+          <c:showLegendKey val="0"/>
+          <c:showVal val="0"/>
+          <c:showCatName val="0"/>
+          <c:showSerName val="0"/>
+          <c:showPercent val="0"/>
+          <c:showBubbleSize val="0"/>
+        </c:dLbls>
+        <c:smooth val="0"/>
+        <c:axId val="37309215"/>
+        <c:axId val="35574671"/>
+      </c:lineChart>
+      <c:catAx>
+        <c:axId val="37309215"/>
+        <c:scaling>
+          <c:orientation val="minMax"/>
+        </c:scaling>
+        <c:delete val="0"/>
+        <c:axPos val="b"/>
+        <c:title>
+          <c:tx>
+            <c:rich>
+              <a:bodyPr rot="0" spcFirstLastPara="1" vertOverflow="ellipsis" vert="horz" wrap="square" anchor="ctr" anchorCtr="1"/>
+              <a:lstStyle/>
+              <a:p>
+                <a:pPr>
+                  <a:defRPr sz="1000" b="0" i="0" u="none" strike="noStrike" kern="1200" baseline="0">
+                    <a:solidFill>
+                      <a:schemeClr val="tx1">
+                        <a:lumMod val="65000"/>
+                        <a:lumOff val="35000"/>
+                      </a:schemeClr>
+                    </a:solidFill>
+                    <a:latin typeface="+mn-lt"/>
+                    <a:ea typeface="+mn-ea"/>
+                    <a:cs typeface="+mn-cs"/>
+                  </a:defRPr>
+                </a:pPr>
+                <a:r>
+                  <a:rPr lang="en-US"/>
+                  <a:t>Burial Year</a:t>
+                </a:r>
+              </a:p>
+            </c:rich>
+          </c:tx>
+          <c:overlay val="0"/>
+          <c:spPr>
+            <a:noFill/>
+            <a:ln>
+              <a:noFill/>
+            </a:ln>
+            <a:effectLst/>
+          </c:spPr>
+          <c:txPr>
+            <a:bodyPr rot="0" spcFirstLastPara="1" vertOverflow="ellipsis" vert="horz" wrap="square" anchor="ctr" anchorCtr="1"/>
+            <a:lstStyle/>
+            <a:p>
+              <a:pPr>
+                <a:defRPr sz="1000" b="0" i="0" u="none" strike="noStrike" kern="1200" baseline="0">
+                  <a:solidFill>
+                    <a:schemeClr val="tx1">
+                      <a:lumMod val="65000"/>
+                      <a:lumOff val="35000"/>
+                    </a:schemeClr>
+                  </a:solidFill>
+                  <a:latin typeface="+mn-lt"/>
+                  <a:ea typeface="+mn-ea"/>
+                  <a:cs typeface="+mn-cs"/>
+                </a:defRPr>
+              </a:pPr>
+              <a:endParaRPr lang="en-US"/>
+            </a:p>
+          </c:txPr>
+        </c:title>
+        <c:numFmt formatCode="General" sourceLinked="1"/>
+        <c:majorTickMark val="none"/>
+        <c:minorTickMark val="none"/>
+        <c:tickLblPos val="nextTo"/>
+        <c:spPr>
+          <a:noFill/>
+          <a:ln w="9525" cap="flat" cmpd="sng" algn="ctr">
+            <a:solidFill>
+              <a:schemeClr val="tx1">
+                <a:lumMod val="15000"/>
+                <a:lumOff val="85000"/>
+              </a:schemeClr>
+            </a:solidFill>
+            <a:round/>
+          </a:ln>
+          <a:effectLst/>
+        </c:spPr>
+        <c:txPr>
+          <a:bodyPr rot="-60000000" spcFirstLastPara="1" vertOverflow="ellipsis" vert="horz" wrap="square" anchor="ctr" anchorCtr="1"/>
+          <a:lstStyle/>
+          <a:p>
+            <a:pPr>
+              <a:defRPr sz="900" b="0" i="0" u="none" strike="noStrike" kern="1200" baseline="0">
+                <a:solidFill>
+                  <a:schemeClr val="tx1">
+                    <a:lumMod val="65000"/>
+                    <a:lumOff val="35000"/>
+                  </a:schemeClr>
+                </a:solidFill>
+                <a:latin typeface="+mn-lt"/>
+                <a:ea typeface="+mn-ea"/>
+                <a:cs typeface="+mn-cs"/>
+              </a:defRPr>
+            </a:pPr>
+            <a:endParaRPr lang="en-US"/>
+          </a:p>
+        </c:txPr>
+        <c:crossAx val="35574671"/>
+        <c:crosses val="autoZero"/>
+        <c:auto val="1"/>
+        <c:lblAlgn val="ctr"/>
+        <c:lblOffset val="100"/>
+        <c:noMultiLvlLbl val="0"/>
+      </c:catAx>
+      <c:valAx>
+        <c:axId val="35574671"/>
+        <c:scaling>
+          <c:orientation val="minMax"/>
+        </c:scaling>
+        <c:delete val="0"/>
+        <c:axPos val="l"/>
+        <c:numFmt formatCode="0%" sourceLinked="1"/>
+        <c:majorTickMark val="none"/>
+        <c:minorTickMark val="none"/>
+        <c:tickLblPos val="nextTo"/>
+        <c:spPr>
+          <a:noFill/>
+          <a:ln>
+            <a:noFill/>
+          </a:ln>
+          <a:effectLst/>
+        </c:spPr>
+        <c:txPr>
+          <a:bodyPr rot="-60000000" spcFirstLastPara="1" vertOverflow="ellipsis" vert="horz" wrap="square" anchor="ctr" anchorCtr="1"/>
+          <a:lstStyle/>
+          <a:p>
+            <a:pPr>
+              <a:defRPr sz="900" b="0" i="0" u="none" strike="noStrike" kern="1200" baseline="0">
+                <a:solidFill>
+                  <a:schemeClr val="tx1">
+                    <a:lumMod val="65000"/>
+                    <a:lumOff val="35000"/>
+                  </a:schemeClr>
+                </a:solidFill>
+                <a:latin typeface="+mn-lt"/>
+                <a:ea typeface="+mn-ea"/>
+                <a:cs typeface="+mn-cs"/>
+              </a:defRPr>
+            </a:pPr>
+            <a:endParaRPr lang="en-US"/>
+          </a:p>
+        </c:txPr>
+        <c:crossAx val="37309215"/>
+        <c:crosses val="autoZero"/>
+        <c:crossBetween val="between"/>
+      </c:valAx>
+      <c:spPr>
+        <a:noFill/>
+        <a:ln>
+          <a:noFill/>
+        </a:ln>
+        <a:effectLst/>
+      </c:spPr>
+    </c:plotArea>
+    <c:plotVisOnly val="1"/>
+    <c:dispBlanksAs val="gap"/>
+    <c:showDLblsOverMax val="0"/>
+  </c:chart>
+  <c:spPr>
+    <a:noFill/>
+    <a:ln>
+      <a:noFill/>
+    </a:ln>
+    <a:effectLst/>
+  </c:spPr>
+  <c:txPr>
+    <a:bodyPr/>
+    <a:lstStyle/>
+    <a:p>
+      <a:pPr>
+        <a:defRPr/>
+      </a:pPr>
+      <a:endParaRPr lang="en-US"/>
+    </a:p>
+  </c:txPr>
+  <c:externalData r:id="rId3">
+    <c:autoUpdate val="0"/>
+  </c:externalData>
+  <c:userShapes r:id="rId4"/>
+</c:chartSpace>
+</file>
+
 <file path=ppt/charts/colors1.xml><?xml version="1.0" encoding="utf-8"?>
 <cs:colorStyle xmlns:cs="http://schemas.microsoft.com/office/drawing/2012/chartStyle" xmlns:a="http://schemas.openxmlformats.org/drawingml/2006/main" meth="cycle" id="10">
   <a:schemeClr val="accent1"/>
@@ -2945,6 +3613,46 @@
 </cs:colorStyle>
 </file>
 
+<file path=ppt/charts/colors7.xml><?xml version="1.0" encoding="utf-8"?>
+<cs:colorStyle xmlns:cs="http://schemas.microsoft.com/office/drawing/2012/chartStyle" xmlns:a="http://schemas.openxmlformats.org/drawingml/2006/main" meth="cycle" id="10">
+  <a:schemeClr val="accent1"/>
+  <a:schemeClr val="accent2"/>
+  <a:schemeClr val="accent3"/>
+  <a:schemeClr val="accent4"/>
+  <a:schemeClr val="accent5"/>
+  <a:schemeClr val="accent6"/>
+  <cs:variation/>
+  <cs:variation>
+    <a:lumMod val="60000"/>
+  </cs:variation>
+  <cs:variation>
+    <a:lumMod val="80000"/>
+    <a:lumOff val="20000"/>
+  </cs:variation>
+  <cs:variation>
+    <a:lumMod val="80000"/>
+  </cs:variation>
+  <cs:variation>
+    <a:lumMod val="60000"/>
+    <a:lumOff val="40000"/>
+  </cs:variation>
+  <cs:variation>
+    <a:lumMod val="50000"/>
+  </cs:variation>
+  <cs:variation>
+    <a:lumMod val="70000"/>
+    <a:lumOff val="30000"/>
+  </cs:variation>
+  <cs:variation>
+    <a:lumMod val="70000"/>
+  </cs:variation>
+  <cs:variation>
+    <a:lumMod val="50000"/>
+    <a:lumOff val="50000"/>
+  </cs:variation>
+</cs:colorStyle>
+</file>
+
 <file path=ppt/charts/style1.xml><?xml version="1.0" encoding="utf-8"?>
 <cs:chartStyle xmlns:cs="http://schemas.microsoft.com/office/drawing/2012/chartStyle" xmlns:a="http://schemas.openxmlformats.org/drawingml/2006/main" id="201">
   <cs:axisTitle>
@@ -5939,6 +6647,522 @@
           </a:schemeClr>
         </a:solidFill>
         <a:round/>
+      </a:ln>
+    </cs:spPr>
+  </cs:upBar>
+  <cs:valueAxis>
+    <cs:lnRef idx="0"/>
+    <cs:fillRef idx="0"/>
+    <cs:effectRef idx="0"/>
+    <cs:fontRef idx="minor">
+      <a:schemeClr val="tx1">
+        <a:lumMod val="65000"/>
+        <a:lumOff val="35000"/>
+      </a:schemeClr>
+    </cs:fontRef>
+    <cs:defRPr sz="900" kern="1200"/>
+  </cs:valueAxis>
+  <cs:wall>
+    <cs:lnRef idx="0"/>
+    <cs:fillRef idx="0"/>
+    <cs:effectRef idx="0"/>
+    <cs:fontRef idx="minor">
+      <a:schemeClr val="tx1"/>
+    </cs:fontRef>
+    <cs:spPr>
+      <a:noFill/>
+      <a:ln>
+        <a:noFill/>
+      </a:ln>
+    </cs:spPr>
+  </cs:wall>
+</cs:chartStyle>
+</file>
+
+<file path=ppt/charts/style7.xml><?xml version="1.0" encoding="utf-8"?>
+<cs:chartStyle xmlns:cs="http://schemas.microsoft.com/office/drawing/2012/chartStyle" xmlns:a="http://schemas.openxmlformats.org/drawingml/2006/main" id="227">
+  <cs:axisTitle>
+    <cs:lnRef idx="0"/>
+    <cs:fillRef idx="0"/>
+    <cs:effectRef idx="0"/>
+    <cs:fontRef idx="minor">
+      <a:schemeClr val="tx1">
+        <a:lumMod val="65000"/>
+        <a:lumOff val="35000"/>
+      </a:schemeClr>
+    </cs:fontRef>
+    <cs:defRPr sz="1000" kern="1200"/>
+  </cs:axisTitle>
+  <cs:categoryAxis>
+    <cs:lnRef idx="0"/>
+    <cs:fillRef idx="0"/>
+    <cs:effectRef idx="0"/>
+    <cs:fontRef idx="minor">
+      <a:schemeClr val="tx1">
+        <a:lumMod val="65000"/>
+        <a:lumOff val="35000"/>
+      </a:schemeClr>
+    </cs:fontRef>
+    <cs:spPr>
+      <a:ln w="9525" cap="flat" cmpd="sng" algn="ctr">
+        <a:solidFill>
+          <a:schemeClr val="tx1">
+            <a:lumMod val="15000"/>
+            <a:lumOff val="85000"/>
+          </a:schemeClr>
+        </a:solidFill>
+        <a:round/>
+      </a:ln>
+    </cs:spPr>
+    <cs:defRPr sz="900" kern="1200"/>
+  </cs:categoryAxis>
+  <cs:chartArea mods="allowNoFillOverride allowNoLineOverride">
+    <cs:lnRef idx="0"/>
+    <cs:fillRef idx="0"/>
+    <cs:effectRef idx="0"/>
+    <cs:fontRef idx="minor">
+      <a:schemeClr val="tx1"/>
+    </cs:fontRef>
+    <cs:spPr>
+      <a:solidFill>
+        <a:schemeClr val="bg1"/>
+      </a:solidFill>
+      <a:ln w="9525" cap="flat" cmpd="sng" algn="ctr">
+        <a:solidFill>
+          <a:schemeClr val="tx1">
+            <a:lumMod val="15000"/>
+            <a:lumOff val="85000"/>
+          </a:schemeClr>
+        </a:solidFill>
+        <a:round/>
+      </a:ln>
+    </cs:spPr>
+    <cs:defRPr sz="1000" kern="1200"/>
+  </cs:chartArea>
+  <cs:dataLabel>
+    <cs:lnRef idx="0"/>
+    <cs:fillRef idx="0"/>
+    <cs:effectRef idx="0"/>
+    <cs:fontRef idx="minor">
+      <a:schemeClr val="tx1">
+        <a:lumMod val="75000"/>
+        <a:lumOff val="25000"/>
+      </a:schemeClr>
+    </cs:fontRef>
+    <cs:defRPr sz="900" kern="1200"/>
+  </cs:dataLabel>
+  <cs:dataLabelCallout>
+    <cs:lnRef idx="0"/>
+    <cs:fillRef idx="0"/>
+    <cs:effectRef idx="0"/>
+    <cs:fontRef idx="minor">
+      <a:schemeClr val="dk1">
+        <a:lumMod val="65000"/>
+        <a:lumOff val="35000"/>
+      </a:schemeClr>
+    </cs:fontRef>
+    <cs:spPr>
+      <a:solidFill>
+        <a:schemeClr val="lt1"/>
+      </a:solidFill>
+      <a:ln>
+        <a:solidFill>
+          <a:schemeClr val="dk1">
+            <a:lumMod val="25000"/>
+            <a:lumOff val="75000"/>
+          </a:schemeClr>
+        </a:solidFill>
+      </a:ln>
+    </cs:spPr>
+    <cs:defRPr sz="900" kern="1200"/>
+    <cs:bodyPr rot="0" spcFirstLastPara="1" vertOverflow="clip" horzOverflow="clip" vert="horz" wrap="square" lIns="36576" tIns="18288" rIns="36576" bIns="18288" anchor="ctr" anchorCtr="1">
+      <a:spAutoFit/>
+    </cs:bodyPr>
+  </cs:dataLabelCallout>
+  <cs:dataPoint>
+    <cs:lnRef idx="0"/>
+    <cs:fillRef idx="1">
+      <cs:styleClr val="auto"/>
+    </cs:fillRef>
+    <cs:effectRef idx="0"/>
+    <cs:fontRef idx="minor">
+      <a:schemeClr val="tx1"/>
+    </cs:fontRef>
+    <cs:spPr>
+      <a:solidFill>
+        <a:schemeClr val="phClr"/>
+      </a:solidFill>
+    </cs:spPr>
+  </cs:dataPoint>
+  <cs:dataPoint3D>
+    <cs:lnRef idx="0"/>
+    <cs:fillRef idx="1">
+      <cs:styleClr val="auto"/>
+    </cs:fillRef>
+    <cs:effectRef idx="0"/>
+    <cs:fontRef idx="minor">
+      <a:schemeClr val="tx1"/>
+    </cs:fontRef>
+    <cs:spPr>
+      <a:solidFill>
+        <a:schemeClr val="phClr"/>
+      </a:solidFill>
+    </cs:spPr>
+  </cs:dataPoint3D>
+  <cs:dataPointLine>
+    <cs:lnRef idx="0">
+      <cs:styleClr val="auto"/>
+    </cs:lnRef>
+    <cs:fillRef idx="1"/>
+    <cs:effectRef idx="0"/>
+    <cs:fontRef idx="minor">
+      <a:schemeClr val="tx1"/>
+    </cs:fontRef>
+    <cs:spPr>
+      <a:ln w="28575" cap="rnd">
+        <a:solidFill>
+          <a:schemeClr val="phClr"/>
+        </a:solidFill>
+        <a:round/>
+      </a:ln>
+    </cs:spPr>
+  </cs:dataPointLine>
+  <cs:dataPointMarker>
+    <cs:lnRef idx="0">
+      <cs:styleClr val="auto"/>
+    </cs:lnRef>
+    <cs:fillRef idx="1">
+      <cs:styleClr val="auto"/>
+    </cs:fillRef>
+    <cs:effectRef idx="0"/>
+    <cs:fontRef idx="minor">
+      <a:schemeClr val="tx1"/>
+    </cs:fontRef>
+    <cs:spPr>
+      <a:solidFill>
+        <a:schemeClr val="phClr"/>
+      </a:solidFill>
+      <a:ln w="9525">
+        <a:solidFill>
+          <a:schemeClr val="phClr"/>
+        </a:solidFill>
+      </a:ln>
+    </cs:spPr>
+  </cs:dataPointMarker>
+  <cs:dataPointMarkerLayout symbol="circle" size="5"/>
+  <cs:dataPointWireframe>
+    <cs:lnRef idx="0">
+      <cs:styleClr val="auto"/>
+    </cs:lnRef>
+    <cs:fillRef idx="1"/>
+    <cs:effectRef idx="0"/>
+    <cs:fontRef idx="minor">
+      <a:schemeClr val="tx1"/>
+    </cs:fontRef>
+    <cs:spPr>
+      <a:ln w="9525" cap="rnd">
+        <a:solidFill>
+          <a:schemeClr val="phClr"/>
+        </a:solidFill>
+        <a:round/>
+      </a:ln>
+    </cs:spPr>
+  </cs:dataPointWireframe>
+  <cs:dataTable>
+    <cs:lnRef idx="0"/>
+    <cs:fillRef idx="0"/>
+    <cs:effectRef idx="0"/>
+    <cs:fontRef idx="minor">
+      <a:schemeClr val="tx1">
+        <a:lumMod val="65000"/>
+        <a:lumOff val="35000"/>
+      </a:schemeClr>
+    </cs:fontRef>
+    <cs:spPr>
+      <a:noFill/>
+      <a:ln w="9525" cap="flat" cmpd="sng" algn="ctr">
+        <a:solidFill>
+          <a:schemeClr val="tx1">
+            <a:lumMod val="15000"/>
+            <a:lumOff val="85000"/>
+          </a:schemeClr>
+        </a:solidFill>
+        <a:round/>
+      </a:ln>
+    </cs:spPr>
+    <cs:defRPr sz="900" kern="1200"/>
+  </cs:dataTable>
+  <cs:downBar>
+    <cs:lnRef idx="0"/>
+    <cs:fillRef idx="0"/>
+    <cs:effectRef idx="0"/>
+    <cs:fontRef idx="minor">
+      <a:schemeClr val="dk1"/>
+    </cs:fontRef>
+    <cs:spPr>
+      <a:solidFill>
+        <a:schemeClr val="dk1">
+          <a:lumMod val="65000"/>
+          <a:lumOff val="35000"/>
+        </a:schemeClr>
+      </a:solidFill>
+      <a:ln w="9525">
+        <a:solidFill>
+          <a:schemeClr val="tx1">
+            <a:lumMod val="65000"/>
+            <a:lumOff val="35000"/>
+          </a:schemeClr>
+        </a:solidFill>
+      </a:ln>
+    </cs:spPr>
+  </cs:downBar>
+  <cs:dropLine>
+    <cs:lnRef idx="0"/>
+    <cs:fillRef idx="0"/>
+    <cs:effectRef idx="0"/>
+    <cs:fontRef idx="minor">
+      <a:schemeClr val="tx1"/>
+    </cs:fontRef>
+    <cs:spPr>
+      <a:ln w="9525" cap="flat" cmpd="sng" algn="ctr">
+        <a:solidFill>
+          <a:schemeClr val="tx1">
+            <a:lumMod val="35000"/>
+            <a:lumOff val="65000"/>
+          </a:schemeClr>
+        </a:solidFill>
+        <a:round/>
+      </a:ln>
+    </cs:spPr>
+  </cs:dropLine>
+  <cs:errorBar>
+    <cs:lnRef idx="0"/>
+    <cs:fillRef idx="0"/>
+    <cs:effectRef idx="0"/>
+    <cs:fontRef idx="minor">
+      <a:schemeClr val="tx1"/>
+    </cs:fontRef>
+    <cs:spPr>
+      <a:ln w="9525" cap="flat" cmpd="sng" algn="ctr">
+        <a:solidFill>
+          <a:schemeClr val="tx1">
+            <a:lumMod val="65000"/>
+            <a:lumOff val="35000"/>
+          </a:schemeClr>
+        </a:solidFill>
+        <a:round/>
+      </a:ln>
+    </cs:spPr>
+  </cs:errorBar>
+  <cs:floor>
+    <cs:lnRef idx="0"/>
+    <cs:fillRef idx="0"/>
+    <cs:effectRef idx="0"/>
+    <cs:fontRef idx="minor">
+      <a:schemeClr val="tx1"/>
+    </cs:fontRef>
+    <cs:spPr>
+      <a:noFill/>
+      <a:ln>
+        <a:noFill/>
+      </a:ln>
+    </cs:spPr>
+  </cs:floor>
+  <cs:gridlineMajor>
+    <cs:lnRef idx="0"/>
+    <cs:fillRef idx="0"/>
+    <cs:effectRef idx="0"/>
+    <cs:fontRef idx="minor">
+      <a:schemeClr val="tx1"/>
+    </cs:fontRef>
+    <cs:spPr>
+      <a:ln w="9525" cap="flat" cmpd="sng" algn="ctr">
+        <a:solidFill>
+          <a:schemeClr val="tx1">
+            <a:lumMod val="15000"/>
+            <a:lumOff val="85000"/>
+          </a:schemeClr>
+        </a:solidFill>
+        <a:round/>
+      </a:ln>
+    </cs:spPr>
+  </cs:gridlineMajor>
+  <cs:gridlineMinor>
+    <cs:lnRef idx="0"/>
+    <cs:fillRef idx="0"/>
+    <cs:effectRef idx="0"/>
+    <cs:fontRef idx="minor">
+      <a:schemeClr val="tx1"/>
+    </cs:fontRef>
+    <cs:spPr>
+      <a:ln w="9525" cap="flat" cmpd="sng" algn="ctr">
+        <a:solidFill>
+          <a:schemeClr val="tx1">
+            <a:lumMod val="5000"/>
+            <a:lumOff val="95000"/>
+          </a:schemeClr>
+        </a:solidFill>
+        <a:round/>
+      </a:ln>
+    </cs:spPr>
+  </cs:gridlineMinor>
+  <cs:hiLoLine>
+    <cs:lnRef idx="0"/>
+    <cs:fillRef idx="0"/>
+    <cs:effectRef idx="0"/>
+    <cs:fontRef idx="minor">
+      <a:schemeClr val="tx1"/>
+    </cs:fontRef>
+    <cs:spPr>
+      <a:ln w="9525" cap="flat" cmpd="sng" algn="ctr">
+        <a:solidFill>
+          <a:schemeClr val="tx1">
+            <a:lumMod val="75000"/>
+            <a:lumOff val="25000"/>
+          </a:schemeClr>
+        </a:solidFill>
+        <a:round/>
+      </a:ln>
+    </cs:spPr>
+  </cs:hiLoLine>
+  <cs:leaderLine>
+    <cs:lnRef idx="0"/>
+    <cs:fillRef idx="0"/>
+    <cs:effectRef idx="0"/>
+    <cs:fontRef idx="minor">
+      <a:schemeClr val="tx1"/>
+    </cs:fontRef>
+    <cs:spPr>
+      <a:ln w="9525" cap="flat" cmpd="sng" algn="ctr">
+        <a:solidFill>
+          <a:schemeClr val="tx1">
+            <a:lumMod val="35000"/>
+            <a:lumOff val="65000"/>
+          </a:schemeClr>
+        </a:solidFill>
+        <a:round/>
+      </a:ln>
+    </cs:spPr>
+  </cs:leaderLine>
+  <cs:legend>
+    <cs:lnRef idx="0"/>
+    <cs:fillRef idx="0"/>
+    <cs:effectRef idx="0"/>
+    <cs:fontRef idx="minor">
+      <a:schemeClr val="tx1">
+        <a:lumMod val="65000"/>
+        <a:lumOff val="35000"/>
+      </a:schemeClr>
+    </cs:fontRef>
+    <cs:defRPr sz="900" kern="1200"/>
+  </cs:legend>
+  <cs:plotArea mods="allowNoFillOverride allowNoLineOverride">
+    <cs:lnRef idx="0"/>
+    <cs:fillRef idx="0"/>
+    <cs:effectRef idx="0"/>
+    <cs:fontRef idx="minor">
+      <a:schemeClr val="tx1"/>
+    </cs:fontRef>
+  </cs:plotArea>
+  <cs:plotArea3D mods="allowNoFillOverride allowNoLineOverride">
+    <cs:lnRef idx="0"/>
+    <cs:fillRef idx="0"/>
+    <cs:effectRef idx="0"/>
+    <cs:fontRef idx="minor">
+      <a:schemeClr val="tx1"/>
+    </cs:fontRef>
+  </cs:plotArea3D>
+  <cs:seriesAxis>
+    <cs:lnRef idx="0"/>
+    <cs:fillRef idx="0"/>
+    <cs:effectRef idx="0"/>
+    <cs:fontRef idx="minor">
+      <a:schemeClr val="tx1">
+        <a:lumMod val="65000"/>
+        <a:lumOff val="35000"/>
+      </a:schemeClr>
+    </cs:fontRef>
+    <cs:defRPr sz="900" kern="1200"/>
+  </cs:seriesAxis>
+  <cs:seriesLine>
+    <cs:lnRef idx="0"/>
+    <cs:fillRef idx="0"/>
+    <cs:effectRef idx="0"/>
+    <cs:fontRef idx="minor">
+      <a:schemeClr val="tx1"/>
+    </cs:fontRef>
+    <cs:spPr>
+      <a:ln w="9525" cap="flat" cmpd="sng" algn="ctr">
+        <a:solidFill>
+          <a:schemeClr val="tx1">
+            <a:lumMod val="35000"/>
+            <a:lumOff val="65000"/>
+          </a:schemeClr>
+        </a:solidFill>
+        <a:round/>
+      </a:ln>
+    </cs:spPr>
+  </cs:seriesLine>
+  <cs:title>
+    <cs:lnRef idx="0"/>
+    <cs:fillRef idx="0"/>
+    <cs:effectRef idx="0"/>
+    <cs:fontRef idx="minor">
+      <a:schemeClr val="tx1">
+        <a:lumMod val="65000"/>
+        <a:lumOff val="35000"/>
+      </a:schemeClr>
+    </cs:fontRef>
+    <cs:defRPr sz="1400" b="0" kern="1200" spc="0" baseline="0"/>
+  </cs:title>
+  <cs:trendline>
+    <cs:lnRef idx="0">
+      <cs:styleClr val="auto"/>
+    </cs:lnRef>
+    <cs:fillRef idx="0"/>
+    <cs:effectRef idx="0"/>
+    <cs:fontRef idx="minor">
+      <a:schemeClr val="tx1"/>
+    </cs:fontRef>
+    <cs:spPr>
+      <a:ln w="19050" cap="rnd">
+        <a:solidFill>
+          <a:schemeClr val="phClr"/>
+        </a:solidFill>
+        <a:prstDash val="sysDot"/>
+      </a:ln>
+    </cs:spPr>
+  </cs:trendline>
+  <cs:trendlineLabel>
+    <cs:lnRef idx="0"/>
+    <cs:fillRef idx="0"/>
+    <cs:effectRef idx="0"/>
+    <cs:fontRef idx="minor">
+      <a:schemeClr val="tx1">
+        <a:lumMod val="65000"/>
+        <a:lumOff val="35000"/>
+      </a:schemeClr>
+    </cs:fontRef>
+    <cs:defRPr sz="900" kern="1200"/>
+  </cs:trendlineLabel>
+  <cs:upBar>
+    <cs:lnRef idx="0"/>
+    <cs:fillRef idx="0"/>
+    <cs:effectRef idx="0"/>
+    <cs:fontRef idx="minor">
+      <a:schemeClr val="dk1"/>
+    </cs:fontRef>
+    <cs:spPr>
+      <a:solidFill>
+        <a:schemeClr val="lt1"/>
+      </a:solidFill>
+      <a:ln w="9525">
+        <a:solidFill>
+          <a:schemeClr val="tx1">
+            <a:lumMod val="15000"/>
+            <a:lumOff val="85000"/>
+          </a:schemeClr>
+        </a:solidFill>
       </a:ln>
     </cs:spPr>
   </cs:upBar>
@@ -6096,19 +7320,19 @@
 <c:userShapes xmlns:c="http://schemas.openxmlformats.org/drawingml/2006/chart">
   <cdr:relSizeAnchor xmlns:cdr="http://schemas.openxmlformats.org/drawingml/2006/chartDrawing">
     <cdr:from>
-      <cdr:x>0.02673</cdr:x>
-      <cdr:y>0.90191</cdr:y>
+      <cdr:x>0.14998</cdr:x>
+      <cdr:y>0.72916</cdr:y>
     </cdr:from>
     <cdr:to>
-      <cdr:x>0.12585</cdr:x>
-      <cdr:y>1</cdr:y>
+      <cdr:x>0.19553</cdr:x>
+      <cdr:y>0.78811</cdr:y>
     </cdr:to>
     <cdr:sp macro="" textlink="">
       <cdr:nvSpPr>
         <cdr:cNvPr id="2" name="TextBox 1">
           <a:extLst xmlns:a="http://schemas.openxmlformats.org/drawingml/2006/main">
             <a:ext uri="{FF2B5EF4-FFF2-40B4-BE49-F238E27FC236}">
-              <a16:creationId xmlns:a16="http://schemas.microsoft.com/office/drawing/2014/main" id="{8F7892D7-480B-4F1A-BA2A-DE465448CE16}"/>
+              <a16:creationId xmlns:a16="http://schemas.microsoft.com/office/drawing/2014/main" id="{D90DF74B-5A5E-4F3D-89BB-7C5222271ADF}"/>
             </a:ext>
           </a:extLst>
         </cdr:cNvPr>
@@ -6116,46 +7340,8 @@
       </cdr:nvSpPr>
       <cdr:spPr>
         <a:xfrm xmlns:a="http://schemas.openxmlformats.org/drawingml/2006/main">
-          <a:off x="246530" y="3173507"/>
-          <a:ext cx="914400" cy="345140"/>
-        </a:xfrm>
-        <a:prstGeom xmlns:a="http://schemas.openxmlformats.org/drawingml/2006/main" prst="rect">
-          <a:avLst/>
-        </a:prstGeom>
-      </cdr:spPr>
-      <cdr:txBody>
-        <a:bodyPr xmlns:a="http://schemas.openxmlformats.org/drawingml/2006/main" vertOverflow="clip" wrap="none" rtlCol="0"/>
-        <a:lstStyle xmlns:a="http://schemas.openxmlformats.org/drawingml/2006/main"/>
-        <a:p xmlns:a="http://schemas.openxmlformats.org/drawingml/2006/main">
-          <a:endParaRPr lang="en-US" sz="1100"/>
-        </a:p>
-      </cdr:txBody>
-    </cdr:sp>
-  </cdr:relSizeAnchor>
-  <cdr:relSizeAnchor xmlns:cdr="http://schemas.openxmlformats.org/drawingml/2006/chartDrawing">
-    <cdr:from>
-      <cdr:x>0.02138</cdr:x>
-      <cdr:y>0.91083</cdr:y>
-    </cdr:from>
-    <cdr:to>
-      <cdr:x>0.3931</cdr:x>
-      <cdr:y>1</cdr:y>
-    </cdr:to>
-    <cdr:sp macro="" textlink="">
-      <cdr:nvSpPr>
-        <cdr:cNvPr id="3" name="TextBox 2">
-          <a:extLst xmlns:a="http://schemas.openxmlformats.org/drawingml/2006/main">
-            <a:ext uri="{FF2B5EF4-FFF2-40B4-BE49-F238E27FC236}">
-              <a16:creationId xmlns:a16="http://schemas.microsoft.com/office/drawing/2014/main" id="{E1AE8021-E998-4842-AD50-92B2995C0D54}"/>
-            </a:ext>
-          </a:extLst>
-        </cdr:cNvPr>
-        <cdr:cNvSpPr txBox="1"/>
-      </cdr:nvSpPr>
-      <cdr:spPr>
-        <a:xfrm xmlns:a="http://schemas.openxmlformats.org/drawingml/2006/main">
-          <a:off x="197223" y="3204883"/>
-          <a:ext cx="3428999" cy="313764"/>
+          <a:off x="1712895" y="4641076"/>
+          <a:ext cx="520228" cy="375213"/>
         </a:xfrm>
         <a:prstGeom xmlns:a="http://schemas.openxmlformats.org/drawingml/2006/main" prst="rect">
           <a:avLst/>
@@ -6166,35 +7352,231 @@
         <a:lstStyle xmlns:a="http://schemas.openxmlformats.org/drawingml/2006/main"/>
         <a:p xmlns:a="http://schemas.openxmlformats.org/drawingml/2006/main">
           <a:r>
-            <a:rPr lang="en-US" sz="1100">
+            <a:rPr lang="en-US" sz="1200" dirty="0">
               <a:solidFill>
-                <a:schemeClr val="bg1">
+                <a:schemeClr val="accent1"/>
+              </a:solidFill>
+            </a:rPr>
+            <a:t>65+</a:t>
+          </a:r>
+        </a:p>
+      </cdr:txBody>
+    </cdr:sp>
+  </cdr:relSizeAnchor>
+  <cdr:relSizeAnchor xmlns:cdr="http://schemas.openxmlformats.org/drawingml/2006/chartDrawing">
+    <cdr:from>
+      <cdr:x>0.13461</cdr:x>
+      <cdr:y>0.60879</cdr:y>
+    </cdr:from>
+    <cdr:to>
+      <cdr:x>0.20531</cdr:x>
+      <cdr:y>0.66345</cdr:y>
+    </cdr:to>
+    <cdr:sp macro="" textlink="">
+      <cdr:nvSpPr>
+        <cdr:cNvPr id="3" name="TextBox 2">
+          <a:extLst xmlns:a="http://schemas.openxmlformats.org/drawingml/2006/main">
+            <a:ext uri="{FF2B5EF4-FFF2-40B4-BE49-F238E27FC236}">
+              <a16:creationId xmlns:a16="http://schemas.microsoft.com/office/drawing/2014/main" id="{87A2C5F7-CAAA-42C2-9BE8-6E48647BC836}"/>
+            </a:ext>
+          </a:extLst>
+        </cdr:cNvPr>
+        <cdr:cNvSpPr txBox="1"/>
+      </cdr:nvSpPr>
+      <cdr:spPr>
+        <a:xfrm xmlns:a="http://schemas.openxmlformats.org/drawingml/2006/main">
+          <a:off x="1537415" y="3874912"/>
+          <a:ext cx="807467" cy="347908"/>
+        </a:xfrm>
+        <a:prstGeom xmlns:a="http://schemas.openxmlformats.org/drawingml/2006/main" prst="rect">
+          <a:avLst/>
+        </a:prstGeom>
+      </cdr:spPr>
+      <cdr:txBody>
+        <a:bodyPr xmlns:a="http://schemas.openxmlformats.org/drawingml/2006/main" vertOverflow="clip" wrap="none" rtlCol="0"/>
+        <a:lstStyle xmlns:a="http://schemas.openxmlformats.org/drawingml/2006/main"/>
+        <a:p xmlns:a="http://schemas.openxmlformats.org/drawingml/2006/main">
+          <a:r>
+            <a:rPr lang="en-US" sz="1100" dirty="0">
+              <a:solidFill>
+                <a:schemeClr val="bg2">
                   <a:lumMod val="50000"/>
                 </a:schemeClr>
               </a:solidFill>
             </a:rPr>
-            <a:t>CDC Data: </a:t>
+            <a:t>40 - 64</a:t>
           </a:r>
+        </a:p>
+      </cdr:txBody>
+    </cdr:sp>
+  </cdr:relSizeAnchor>
+  <cdr:relSizeAnchor xmlns:cdr="http://schemas.openxmlformats.org/drawingml/2006/chartDrawing">
+    <cdr:from>
+      <cdr:x>0.13454</cdr:x>
+      <cdr:y>0.5412</cdr:y>
+    </cdr:from>
+    <cdr:to>
+      <cdr:x>0.20592</cdr:x>
+      <cdr:y>0.598</cdr:y>
+    </cdr:to>
+    <cdr:sp macro="" textlink="">
+      <cdr:nvSpPr>
+        <cdr:cNvPr id="4" name="TextBox 3">
+          <a:extLst xmlns:a="http://schemas.openxmlformats.org/drawingml/2006/main">
+            <a:ext uri="{FF2B5EF4-FFF2-40B4-BE49-F238E27FC236}">
+              <a16:creationId xmlns:a16="http://schemas.microsoft.com/office/drawing/2014/main" id="{820006AA-90FF-47BA-87D8-B07B753C8A5F}"/>
+            </a:ext>
+          </a:extLst>
+        </cdr:cNvPr>
+        <cdr:cNvSpPr txBox="1"/>
+      </cdr:nvSpPr>
+      <cdr:spPr>
+        <a:xfrm xmlns:a="http://schemas.openxmlformats.org/drawingml/2006/main">
+          <a:off x="1536556" y="3444695"/>
+          <a:ext cx="815233" cy="361528"/>
+        </a:xfrm>
+        <a:prstGeom xmlns:a="http://schemas.openxmlformats.org/drawingml/2006/main" prst="rect">
+          <a:avLst/>
+        </a:prstGeom>
+      </cdr:spPr>
+      <cdr:txBody>
+        <a:bodyPr xmlns:a="http://schemas.openxmlformats.org/drawingml/2006/main" vertOverflow="clip" wrap="none" rtlCol="0"/>
+        <a:lstStyle xmlns:a="http://schemas.openxmlformats.org/drawingml/2006/main"/>
+        <a:p xmlns:a="http://schemas.openxmlformats.org/drawingml/2006/main">
           <a:r>
-            <a:rPr lang="en-US">
+            <a:rPr lang="en-US" sz="1100" dirty="0">
               <a:solidFill>
-                <a:schemeClr val="bg1">
+                <a:schemeClr val="bg2">
                   <a:lumMod val="50000"/>
                 </a:schemeClr>
               </a:solidFill>
-              <a:hlinkClick xmlns:r="http://schemas.openxmlformats.org/officeDocument/2006/relationships" r:id="">
-                <a:extLst>
-                  <a:ext uri="{A12FA001-AC4F-418D-AE19-62706E023703}">
-                    <ahyp:hlinkClr xmlns:ahyp="http://schemas.microsoft.com/office/drawing/2018/hyperlinkcolor" val="tx"/>
-                  </a:ext>
-                </a:extLst>
-              </a:hlinkClick>
             </a:rPr>
-            <a:t>https://www.cdc.gov/nchs/fastats/deaths.htm</a:t>
+            <a:t>26</a:t>
           </a:r>
-          <a:endParaRPr lang="en-US" sz="1100">
+          <a:r>
+            <a:rPr lang="en-US" sz="1100" baseline="0" dirty="0">
+              <a:solidFill>
+                <a:schemeClr val="bg2">
+                  <a:lumMod val="50000"/>
+                </a:schemeClr>
+              </a:solidFill>
+            </a:rPr>
+            <a:t> - 40</a:t>
+          </a:r>
+          <a:endParaRPr lang="en-US" sz="1100" dirty="0">
             <a:solidFill>
-              <a:schemeClr val="bg1">
+              <a:schemeClr val="bg2">
+                <a:lumMod val="50000"/>
+              </a:schemeClr>
+            </a:solidFill>
+          </a:endParaRPr>
+        </a:p>
+      </cdr:txBody>
+    </cdr:sp>
+  </cdr:relSizeAnchor>
+  <cdr:relSizeAnchor xmlns:cdr="http://schemas.openxmlformats.org/drawingml/2006/chartDrawing">
+    <cdr:from>
+      <cdr:x>0.13541</cdr:x>
+      <cdr:y>0.56906</cdr:y>
+    </cdr:from>
+    <cdr:to>
+      <cdr:x>0.20611</cdr:x>
+      <cdr:y>0.61515</cdr:y>
+    </cdr:to>
+    <cdr:sp macro="" textlink="">
+      <cdr:nvSpPr>
+        <cdr:cNvPr id="5" name="TextBox 4">
+          <a:extLst xmlns:a="http://schemas.openxmlformats.org/drawingml/2006/main">
+            <a:ext uri="{FF2B5EF4-FFF2-40B4-BE49-F238E27FC236}">
+              <a16:creationId xmlns:a16="http://schemas.microsoft.com/office/drawing/2014/main" id="{7561B64D-0D0E-46B0-A693-6A289CE17E48}"/>
+            </a:ext>
+          </a:extLst>
+        </cdr:cNvPr>
+        <cdr:cNvSpPr txBox="1"/>
+      </cdr:nvSpPr>
+      <cdr:spPr>
+        <a:xfrm xmlns:a="http://schemas.openxmlformats.org/drawingml/2006/main">
+          <a:off x="1546478" y="3622021"/>
+          <a:ext cx="807467" cy="293360"/>
+        </a:xfrm>
+        <a:prstGeom xmlns:a="http://schemas.openxmlformats.org/drawingml/2006/main" prst="rect">
+          <a:avLst/>
+        </a:prstGeom>
+      </cdr:spPr>
+      <cdr:txBody>
+        <a:bodyPr xmlns:a="http://schemas.openxmlformats.org/drawingml/2006/main" vertOverflow="clip" wrap="none" rtlCol="0"/>
+        <a:lstStyle xmlns:a="http://schemas.openxmlformats.org/drawingml/2006/main"/>
+        <a:p xmlns:a="http://schemas.openxmlformats.org/drawingml/2006/main">
+          <a:r>
+            <a:rPr lang="en-US" sz="1100" dirty="0">
+              <a:solidFill>
+                <a:schemeClr val="bg2">
+                  <a:lumMod val="50000"/>
+                </a:schemeClr>
+              </a:solidFill>
+            </a:rPr>
+            <a:t>19 - 25</a:t>
+          </a:r>
+        </a:p>
+      </cdr:txBody>
+    </cdr:sp>
+  </cdr:relSizeAnchor>
+  <cdr:relSizeAnchor xmlns:cdr="http://schemas.openxmlformats.org/drawingml/2006/chartDrawing">
+    <cdr:from>
+      <cdr:x>0.13989</cdr:x>
+      <cdr:y>0.67681</cdr:y>
+    </cdr:from>
+    <cdr:to>
+      <cdr:x>0.20924</cdr:x>
+      <cdr:y>0.73683</cdr:y>
+    </cdr:to>
+    <cdr:sp macro="" textlink="">
+      <cdr:nvSpPr>
+        <cdr:cNvPr id="6" name="TextBox 5">
+          <a:extLst xmlns:a="http://schemas.openxmlformats.org/drawingml/2006/main">
+            <a:ext uri="{FF2B5EF4-FFF2-40B4-BE49-F238E27FC236}">
+              <a16:creationId xmlns:a16="http://schemas.microsoft.com/office/drawing/2014/main" id="{F3F5689D-0CDD-41E1-95D5-B132C4CF9348}"/>
+            </a:ext>
+          </a:extLst>
+        </cdr:cNvPr>
+        <cdr:cNvSpPr txBox="1"/>
+      </cdr:nvSpPr>
+      <cdr:spPr>
+        <a:xfrm xmlns:a="http://schemas.openxmlformats.org/drawingml/2006/main">
+          <a:off x="1597697" y="4307882"/>
+          <a:ext cx="792049" cy="382024"/>
+        </a:xfrm>
+        <a:prstGeom xmlns:a="http://schemas.openxmlformats.org/drawingml/2006/main" prst="rect">
+          <a:avLst/>
+        </a:prstGeom>
+      </cdr:spPr>
+      <cdr:txBody>
+        <a:bodyPr xmlns:a="http://schemas.openxmlformats.org/drawingml/2006/main" vertOverflow="clip" wrap="none" rtlCol="0"/>
+        <a:lstStyle xmlns:a="http://schemas.openxmlformats.org/drawingml/2006/main"/>
+        <a:p xmlns:a="http://schemas.openxmlformats.org/drawingml/2006/main">
+          <a:r>
+            <a:rPr lang="en-US" sz="1100" dirty="0">
+              <a:solidFill>
+                <a:schemeClr val="bg2">
+                  <a:lumMod val="50000"/>
+                </a:schemeClr>
+              </a:solidFill>
+            </a:rPr>
+            <a:t>0 -</a:t>
+          </a:r>
+          <a:r>
+            <a:rPr lang="en-US" sz="1100" baseline="0" dirty="0">
+              <a:solidFill>
+                <a:schemeClr val="bg2">
+                  <a:lumMod val="50000"/>
+                </a:schemeClr>
+              </a:solidFill>
+            </a:rPr>
+            <a:t> 18</a:t>
+          </a:r>
+          <a:endParaRPr lang="en-US" sz="1100" dirty="0">
+            <a:solidFill>
+              <a:schemeClr val="bg2">
                 <a:lumMod val="50000"/>
               </a:schemeClr>
             </a:solidFill>
@@ -9750,6 +11132,66 @@
       </p:grpSpPr>
       <p:graphicFrame>
         <p:nvGraphicFramePr>
+          <p:cNvPr id="4" name="Chart 3">
+            <a:extLst>
+              <a:ext uri="{FF2B5EF4-FFF2-40B4-BE49-F238E27FC236}">
+                <a16:creationId xmlns:a16="http://schemas.microsoft.com/office/drawing/2014/main" id="{01013308-3AE8-474D-9B49-3047835A3EBC}"/>
+              </a:ext>
+            </a:extLst>
+          </p:cNvPr>
+          <p:cNvGraphicFramePr>
+            <a:graphicFrameLocks/>
+          </p:cNvGraphicFramePr>
+          <p:nvPr>
+            <p:extLst>
+              <p:ext uri="{D42A27DB-BD31-4B8C-83A1-F6EECF244321}">
+                <p14:modId xmlns:p14="http://schemas.microsoft.com/office/powerpoint/2010/main" val="2257656551"/>
+              </p:ext>
+            </p:extLst>
+          </p:nvPr>
+        </p:nvGraphicFramePr>
+        <p:xfrm>
+          <a:off x="496047" y="268941"/>
+          <a:ext cx="11421035" cy="6364941"/>
+        </p:xfrm>
+        <a:graphic>
+          <a:graphicData uri="http://schemas.openxmlformats.org/drawingml/2006/chart">
+            <c:chart xmlns:c="http://schemas.openxmlformats.org/drawingml/2006/chart" xmlns:r="http://schemas.openxmlformats.org/officeDocument/2006/relationships" r:id="rId2"/>
+          </a:graphicData>
+        </a:graphic>
+      </p:graphicFrame>
+    </p:spTree>
+    <p:extLst>
+      <p:ext uri="{BB962C8B-B14F-4D97-AF65-F5344CB8AC3E}">
+        <p14:creationId xmlns:p14="http://schemas.microsoft.com/office/powerpoint/2010/main" val="567743161"/>
+      </p:ext>
+    </p:extLst>
+  </p:cSld>
+  <p:clrMapOvr>
+    <a:masterClrMapping/>
+  </p:clrMapOvr>
+</p:sld>
+</file>
+
+<file path=ppt/slides/slide5.xml><?xml version="1.0" encoding="utf-8"?>
+<p:sld xmlns:a="http://schemas.openxmlformats.org/drawingml/2006/main" xmlns:r="http://schemas.openxmlformats.org/officeDocument/2006/relationships" xmlns:p="http://schemas.openxmlformats.org/presentationml/2006/main">
+  <p:cSld>
+    <p:spTree>
+      <p:nvGrpSpPr>
+        <p:cNvPr id="1" name=""/>
+        <p:cNvGrpSpPr/>
+        <p:nvPr/>
+      </p:nvGrpSpPr>
+      <p:grpSpPr>
+        <a:xfrm>
+          <a:off x="0" y="0"/>
+          <a:ext cx="0" cy="0"/>
+          <a:chOff x="0" y="0"/>
+          <a:chExt cx="0" cy="0"/>
+        </a:xfrm>
+      </p:grpSpPr>
+      <p:graphicFrame>
+        <p:nvGraphicFramePr>
           <p:cNvPr id="5" name="Table 4">
             <a:extLst>
               <a:ext uri="{FF2B5EF4-FFF2-40B4-BE49-F238E27FC236}">

</xml_diff>